<commit_message>
rpz and prez update
</commit_message>
<xml_diff>
--- a/docs/diploma/presentation/Presentation.pptx
+++ b/docs/diploma/presentation/Presentation.pptx
@@ -215,7 +215,7 @@
           <a:p>
             <a:fld id="{6E6D9DCE-A04C-4D8C-8931-135BCE43B3A4}" type="datetimeFigureOut">
               <a:rPr lang="ru-RU" smtClean="0"/>
-              <a:t>31.05.2023</a:t>
+              <a:t>02.06.2023</a:t>
             </a:fld>
             <a:endParaRPr lang="ru-RU"/>
           </a:p>
@@ -695,7 +695,7 @@
           <a:p>
             <a:fld id="{03C8B24E-9072-4A63-9CF3-2091FBEE0926}" type="datetime1">
               <a:rPr lang="ru-RU" smtClean="0"/>
-              <a:t>31.05.2023</a:t>
+              <a:t>02.06.2023</a:t>
             </a:fld>
             <a:endParaRPr lang="ru-RU"/>
           </a:p>
@@ -863,7 +863,7 @@
           <a:p>
             <a:fld id="{A2DF9016-3B0A-48DB-AA68-59A340F15C97}" type="datetime1">
               <a:rPr lang="ru-RU" smtClean="0"/>
-              <a:t>31.05.2023</a:t>
+              <a:t>02.06.2023</a:t>
             </a:fld>
             <a:endParaRPr lang="ru-RU"/>
           </a:p>
@@ -1041,7 +1041,7 @@
           <a:p>
             <a:fld id="{ED610CF0-5587-4445-8FAA-D1C14AACBF04}" type="datetime1">
               <a:rPr lang="ru-RU" smtClean="0"/>
-              <a:t>31.05.2023</a:t>
+              <a:t>02.06.2023</a:t>
             </a:fld>
             <a:endParaRPr lang="ru-RU"/>
           </a:p>
@@ -1209,7 +1209,7 @@
           <a:p>
             <a:fld id="{7D08D0F9-4486-4C0D-A4C3-9DF41EB36BAE}" type="datetime1">
               <a:rPr lang="ru-RU" smtClean="0"/>
-              <a:t>31.05.2023</a:t>
+              <a:t>02.06.2023</a:t>
             </a:fld>
             <a:endParaRPr lang="ru-RU"/>
           </a:p>
@@ -1454,7 +1454,7 @@
           <a:p>
             <a:fld id="{DCBAD543-8B65-47C4-9868-AF907E0250FD}" type="datetime1">
               <a:rPr lang="ru-RU" smtClean="0"/>
-              <a:t>31.05.2023</a:t>
+              <a:t>02.06.2023</a:t>
             </a:fld>
             <a:endParaRPr lang="ru-RU"/>
           </a:p>
@@ -1683,7 +1683,7 @@
           <a:p>
             <a:fld id="{D011704B-73F3-4C9F-8E51-784348AA7A81}" type="datetime1">
               <a:rPr lang="ru-RU" smtClean="0"/>
-              <a:t>31.05.2023</a:t>
+              <a:t>02.06.2023</a:t>
             </a:fld>
             <a:endParaRPr lang="ru-RU"/>
           </a:p>
@@ -2047,7 +2047,7 @@
           <a:p>
             <a:fld id="{0ECF71ED-13A9-4254-AC52-66FE8A8F1C23}" type="datetime1">
               <a:rPr lang="ru-RU" smtClean="0"/>
-              <a:t>31.05.2023</a:t>
+              <a:t>02.06.2023</a:t>
             </a:fld>
             <a:endParaRPr lang="ru-RU"/>
           </a:p>
@@ -2164,7 +2164,7 @@
           <a:p>
             <a:fld id="{D4D53A68-8569-454A-A05A-DDDF27B07A9D}" type="datetime1">
               <a:rPr lang="ru-RU" smtClean="0"/>
-              <a:t>31.05.2023</a:t>
+              <a:t>02.06.2023</a:t>
             </a:fld>
             <a:endParaRPr lang="ru-RU"/>
           </a:p>
@@ -2259,7 +2259,7 @@
           <a:p>
             <a:fld id="{DEBD3B65-C67D-4788-8DD4-B5879859E161}" type="datetime1">
               <a:rPr lang="ru-RU" smtClean="0"/>
-              <a:t>31.05.2023</a:t>
+              <a:t>02.06.2023</a:t>
             </a:fld>
             <a:endParaRPr lang="ru-RU"/>
           </a:p>
@@ -2534,7 +2534,7 @@
           <a:p>
             <a:fld id="{A7D08EAE-43AF-44C1-A7D9-E10A9ACFDA1E}" type="datetime1">
               <a:rPr lang="ru-RU" smtClean="0"/>
-              <a:t>31.05.2023</a:t>
+              <a:t>02.06.2023</a:t>
             </a:fld>
             <a:endParaRPr lang="ru-RU"/>
           </a:p>
@@ -2786,7 +2786,7 @@
           <a:p>
             <a:fld id="{4AC49E42-2C28-4AEE-A493-6691E23865B3}" type="datetime1">
               <a:rPr lang="ru-RU" smtClean="0"/>
-              <a:t>31.05.2023</a:t>
+              <a:t>02.06.2023</a:t>
             </a:fld>
             <a:endParaRPr lang="ru-RU"/>
           </a:p>
@@ -2997,7 +2997,7 @@
           <a:p>
             <a:fld id="{E56321EE-D23F-4780-B318-01CDAA890F27}" type="datetime1">
               <a:rPr lang="ru-RU" smtClean="0"/>
-              <a:t>31.05.2023</a:t>
+              <a:t>02.06.2023</a:t>
             </a:fld>
             <a:endParaRPr lang="ru-RU"/>
           </a:p>
@@ -4101,12 +4101,41 @@
           </a:p>
         </p:txBody>
       </p:sp>
+      <p:sp>
+        <p:nvSpPr>
+          <p:cNvPr id="4" name="Номер слайда 3">
+            <a:extLst>
+              <a:ext uri="{FF2B5EF4-FFF2-40B4-BE49-F238E27FC236}">
+                <a16:creationId xmlns:a16="http://schemas.microsoft.com/office/drawing/2014/main" id="{2F919300-7662-42C0-BC66-A24ABB342C77}"/>
+              </a:ext>
+            </a:extLst>
+          </p:cNvPr>
+          <p:cNvSpPr>
+            <a:spLocks noGrp="1"/>
+          </p:cNvSpPr>
+          <p:nvPr>
+            <p:ph type="sldNum" sz="quarter" idx="12"/>
+          </p:nvPr>
+        </p:nvSpPr>
+        <p:spPr/>
+        <p:txBody>
+          <a:bodyPr/>
+          <a:lstStyle/>
+          <a:p>
+            <a:fld id="{C4F09F00-B2EF-4E92-A50A-EB2934570B6C}" type="slidenum">
+              <a:rPr lang="ru-RU" smtClean="0"/>
+              <a:t>11</a:t>
+            </a:fld>
+            <a:endParaRPr lang="ru-RU"/>
+          </a:p>
+        </p:txBody>
+      </p:sp>
       <p:pic>
         <p:nvPicPr>
-          <p:cNvPr id="6" name="Объект 5">
+          <p:cNvPr id="9" name="Объект 8">
             <a:extLst>
               <a:ext uri="{FF2B5EF4-FFF2-40B4-BE49-F238E27FC236}">
-                <a16:creationId xmlns:a16="http://schemas.microsoft.com/office/drawing/2014/main" id="{03475AB5-5CF4-4A8B-8C5E-24BE93ED0941}"/>
+                <a16:creationId xmlns:a16="http://schemas.microsoft.com/office/drawing/2014/main" id="{978DE9E4-70F5-44FD-9961-67DE5B655127}"/>
               </a:ext>
             </a:extLst>
           </p:cNvPr>
@@ -4131,40 +4160,11 @@
         </p:blipFill>
         <p:spPr>
           <a:xfrm>
-            <a:off x="5376721" y="1825625"/>
-            <a:ext cx="1438557" cy="4351338"/>
+            <a:off x="5447586" y="1690688"/>
+            <a:ext cx="1296827" cy="4351338"/>
           </a:xfrm>
         </p:spPr>
       </p:pic>
-      <p:sp>
-        <p:nvSpPr>
-          <p:cNvPr id="4" name="Номер слайда 3">
-            <a:extLst>
-              <a:ext uri="{FF2B5EF4-FFF2-40B4-BE49-F238E27FC236}">
-                <a16:creationId xmlns:a16="http://schemas.microsoft.com/office/drawing/2014/main" id="{2F919300-7662-42C0-BC66-A24ABB342C77}"/>
-              </a:ext>
-            </a:extLst>
-          </p:cNvPr>
-          <p:cNvSpPr>
-            <a:spLocks noGrp="1"/>
-          </p:cNvSpPr>
-          <p:nvPr>
-            <p:ph type="sldNum" sz="quarter" idx="12"/>
-          </p:nvPr>
-        </p:nvSpPr>
-        <p:spPr/>
-        <p:txBody>
-          <a:bodyPr/>
-          <a:lstStyle/>
-          <a:p>
-            <a:fld id="{C4F09F00-B2EF-4E92-A50A-EB2934570B6C}" type="slidenum">
-              <a:rPr lang="ru-RU" smtClean="0"/>
-              <a:t>11</a:t>
-            </a:fld>
-            <a:endParaRPr lang="ru-RU"/>
-          </a:p>
-        </p:txBody>
-      </p:sp>
     </p:spTree>
     <p:extLst>
       <p:ext uri="{BB962C8B-B14F-4D97-AF65-F5344CB8AC3E}">
@@ -4239,7 +4239,7 @@
             <p:ph idx="1"/>
             <p:extLst>
               <p:ext uri="{D42A27DB-BD31-4B8C-83A1-F6EECF244321}">
-                <p14:modId xmlns:p14="http://schemas.microsoft.com/office/powerpoint/2010/main" val="138608165"/>
+                <p14:modId xmlns:p14="http://schemas.microsoft.com/office/powerpoint/2010/main" val="1507600513"/>
               </p:ext>
             </p:extLst>
           </p:nvPr>
@@ -4428,7 +4428,7 @@
                     <a:p>
                       <a:r>
                         <a:rPr lang="ru-RU" dirty="0"/>
-                        <a:t>Цветное изображение с разрешением 640 на 480 пикселей</a:t>
+                        <a:t>Цветное изображение с разрешением 640 на 480 пикселей и глубиной цвета 24 бит</a:t>
                       </a:r>
                     </a:p>
                   </a:txBody>
@@ -4461,7 +4461,7 @@
                     <a:p>
                       <a:r>
                         <a:rPr lang="ru-RU" dirty="0"/>
-                        <a:t>Изображение в оттенках серого с разрешением 640 на 480 пикселей</a:t>
+                        <a:t>Изображение в оттенках серого с разрешением 640 на 480 пикселей и глубиной цвета 24 бит</a:t>
                       </a:r>
                     </a:p>
                   </a:txBody>
@@ -4536,7 +4536,7 @@
           <a:p>
             <a:r>
               <a:rPr lang="ru-RU" dirty="0"/>
-              <a:t>Выходные данные - цветное изображение с разрешением 640 на 480 пикселей</a:t>
+              <a:t>Выходные данные - цветное изображение с разрешением 640 на 480 пикселей и глубиной цвета 24 бит</a:t>
             </a:r>
           </a:p>
         </p:txBody>
@@ -4599,12 +4599,41 @@
           </a:p>
         </p:txBody>
       </p:sp>
+      <p:sp>
+        <p:nvSpPr>
+          <p:cNvPr id="4" name="Номер слайда 3">
+            <a:extLst>
+              <a:ext uri="{FF2B5EF4-FFF2-40B4-BE49-F238E27FC236}">
+                <a16:creationId xmlns:a16="http://schemas.microsoft.com/office/drawing/2014/main" id="{FA2AE177-265F-495D-B724-CCDAD9D915BD}"/>
+              </a:ext>
+            </a:extLst>
+          </p:cNvPr>
+          <p:cNvSpPr>
+            <a:spLocks noGrp="1"/>
+          </p:cNvSpPr>
+          <p:nvPr>
+            <p:ph type="sldNum" sz="quarter" idx="12"/>
+          </p:nvPr>
+        </p:nvSpPr>
+        <p:spPr/>
+        <p:txBody>
+          <a:bodyPr/>
+          <a:lstStyle/>
+          <a:p>
+            <a:fld id="{C4F09F00-B2EF-4E92-A50A-EB2934570B6C}" type="slidenum">
+              <a:rPr lang="ru-RU" smtClean="0"/>
+              <a:t>13</a:t>
+            </a:fld>
+            <a:endParaRPr lang="ru-RU"/>
+          </a:p>
+        </p:txBody>
+      </p:sp>
       <p:pic>
         <p:nvPicPr>
-          <p:cNvPr id="6" name="Объект 5">
+          <p:cNvPr id="8" name="Объект 7">
             <a:extLst>
               <a:ext uri="{FF2B5EF4-FFF2-40B4-BE49-F238E27FC236}">
-                <a16:creationId xmlns:a16="http://schemas.microsoft.com/office/drawing/2014/main" id="{35FB9F70-3878-4ABD-95B8-2DDDFBDBF3C7}"/>
+                <a16:creationId xmlns:a16="http://schemas.microsoft.com/office/drawing/2014/main" id="{006F41FD-EB56-4B7C-8D1F-9020D7BE9AEA}"/>
               </a:ext>
             </a:extLst>
           </p:cNvPr>
@@ -4629,40 +4658,11 @@
         </p:blipFill>
         <p:spPr>
           <a:xfrm>
-            <a:off x="3158619" y="1690688"/>
-            <a:ext cx="5874762" cy="4351338"/>
+            <a:off x="3178313" y="1690688"/>
+            <a:ext cx="5835373" cy="4351338"/>
           </a:xfrm>
         </p:spPr>
       </p:pic>
-      <p:sp>
-        <p:nvSpPr>
-          <p:cNvPr id="4" name="Номер слайда 3">
-            <a:extLst>
-              <a:ext uri="{FF2B5EF4-FFF2-40B4-BE49-F238E27FC236}">
-                <a16:creationId xmlns:a16="http://schemas.microsoft.com/office/drawing/2014/main" id="{FA2AE177-265F-495D-B724-CCDAD9D915BD}"/>
-              </a:ext>
-            </a:extLst>
-          </p:cNvPr>
-          <p:cNvSpPr>
-            <a:spLocks noGrp="1"/>
-          </p:cNvSpPr>
-          <p:nvPr>
-            <p:ph type="sldNum" sz="quarter" idx="12"/>
-          </p:nvPr>
-        </p:nvSpPr>
-        <p:spPr/>
-        <p:txBody>
-          <a:bodyPr/>
-          <a:lstStyle/>
-          <a:p>
-            <a:fld id="{C4F09F00-B2EF-4E92-A50A-EB2934570B6C}" type="slidenum">
-              <a:rPr lang="ru-RU" smtClean="0"/>
-              <a:t>13</a:t>
-            </a:fld>
-            <a:endParaRPr lang="ru-RU"/>
-          </a:p>
-        </p:txBody>
-      </p:sp>
     </p:spTree>
     <p:extLst>
       <p:ext uri="{BB962C8B-B14F-4D97-AF65-F5344CB8AC3E}">
@@ -5084,113 +5084,6 @@
           </a:p>
         </p:txBody>
       </p:sp>
-      <p:pic>
-        <p:nvPicPr>
-          <p:cNvPr id="8" name="Объект 7">
-            <a:extLst>
-              <a:ext uri="{FF2B5EF4-FFF2-40B4-BE49-F238E27FC236}">
-                <a16:creationId xmlns:a16="http://schemas.microsoft.com/office/drawing/2014/main" id="{A4CA2969-4A9D-4615-B21B-84AA7FB15C31}"/>
-              </a:ext>
-            </a:extLst>
-          </p:cNvPr>
-          <p:cNvPicPr>
-            <a:picLocks noGrp="1" noChangeAspect="1"/>
-          </p:cNvPicPr>
-          <p:nvPr>
-            <p:ph idx="1"/>
-          </p:nvPr>
-        </p:nvPicPr>
-        <p:blipFill>
-          <a:blip r:embed="rId2">
-            <a:extLst>
-              <a:ext uri="{28A0092B-C50C-407E-A947-70E740481C1C}">
-                <a14:useLocalDpi xmlns:a14="http://schemas.microsoft.com/office/drawing/2010/main" val="0"/>
-              </a:ext>
-            </a:extLst>
-          </a:blip>
-          <a:stretch>
-            <a:fillRect/>
-          </a:stretch>
-        </p:blipFill>
-        <p:spPr>
-          <a:xfrm>
-            <a:off x="1752961" y="1962149"/>
-            <a:ext cx="2270399" cy="1931721"/>
-          </a:xfrm>
-        </p:spPr>
-      </p:pic>
-      <p:pic>
-        <p:nvPicPr>
-          <p:cNvPr id="10" name="Рисунок 9">
-            <a:extLst>
-              <a:ext uri="{FF2B5EF4-FFF2-40B4-BE49-F238E27FC236}">
-                <a16:creationId xmlns:a16="http://schemas.microsoft.com/office/drawing/2014/main" id="{25D96974-8CB9-4E76-9002-9A06F863E189}"/>
-              </a:ext>
-            </a:extLst>
-          </p:cNvPr>
-          <p:cNvPicPr>
-            <a:picLocks noChangeAspect="1"/>
-          </p:cNvPicPr>
-          <p:nvPr/>
-        </p:nvPicPr>
-        <p:blipFill>
-          <a:blip r:embed="rId3">
-            <a:extLst>
-              <a:ext uri="{28A0092B-C50C-407E-A947-70E740481C1C}">
-                <a14:useLocalDpi xmlns:a14="http://schemas.microsoft.com/office/drawing/2010/main" val="0"/>
-              </a:ext>
-            </a:extLst>
-          </a:blip>
-          <a:stretch>
-            <a:fillRect/>
-          </a:stretch>
-        </p:blipFill>
-        <p:spPr>
-          <a:xfrm>
-            <a:off x="4709077" y="1962148"/>
-            <a:ext cx="2520660" cy="1931721"/>
-          </a:xfrm>
-          <a:prstGeom prst="rect">
-            <a:avLst/>
-          </a:prstGeom>
-        </p:spPr>
-      </p:pic>
-      <p:pic>
-        <p:nvPicPr>
-          <p:cNvPr id="12" name="Рисунок 11">
-            <a:extLst>
-              <a:ext uri="{FF2B5EF4-FFF2-40B4-BE49-F238E27FC236}">
-                <a16:creationId xmlns:a16="http://schemas.microsoft.com/office/drawing/2014/main" id="{098CDAE5-10D7-412B-B18C-E87F7CE4E0B0}"/>
-              </a:ext>
-            </a:extLst>
-          </p:cNvPr>
-          <p:cNvPicPr>
-            <a:picLocks noChangeAspect="1"/>
-          </p:cNvPicPr>
-          <p:nvPr/>
-        </p:nvPicPr>
-        <p:blipFill>
-          <a:blip r:embed="rId4">
-            <a:extLst>
-              <a:ext uri="{28A0092B-C50C-407E-A947-70E740481C1C}">
-                <a14:useLocalDpi xmlns:a14="http://schemas.microsoft.com/office/drawing/2010/main" val="0"/>
-              </a:ext>
-            </a:extLst>
-          </a:blip>
-          <a:stretch>
-            <a:fillRect/>
-          </a:stretch>
-        </p:blipFill>
-        <p:spPr>
-          <a:xfrm>
-            <a:off x="8105513" y="1962147"/>
-            <a:ext cx="1568208" cy="1936059"/>
-          </a:xfrm>
-          <a:prstGeom prst="rect">
-            <a:avLst/>
-          </a:prstGeom>
-        </p:spPr>
-      </p:pic>
       <p:graphicFrame>
         <p:nvGraphicFramePr>
           <p:cNvPr id="13" name="Таблица 13">
@@ -5206,13 +5099,13 @@
           <p:nvPr>
             <p:extLst>
               <p:ext uri="{D42A27DB-BD31-4B8C-83A1-F6EECF244321}">
-                <p14:modId xmlns:p14="http://schemas.microsoft.com/office/powerpoint/2010/main" val="3684505861"/>
+                <p14:modId xmlns:p14="http://schemas.microsoft.com/office/powerpoint/2010/main" val="641190444"/>
               </p:ext>
             </p:extLst>
           </p:nvPr>
         </p:nvGraphicFramePr>
         <p:xfrm>
-          <a:off x="1905407" y="4385598"/>
+          <a:off x="2032000" y="2895809"/>
           <a:ext cx="8128000" cy="1752600"/>
         </p:xfrm>
         <a:graphic>
@@ -5376,6 +5269,60 @@
           </a:graphicData>
         </a:graphic>
       </p:graphicFrame>
+      <p:sp>
+        <p:nvSpPr>
+          <p:cNvPr id="6" name="TextBox 5">
+            <a:extLst>
+              <a:ext uri="{FF2B5EF4-FFF2-40B4-BE49-F238E27FC236}">
+                <a16:creationId xmlns:a16="http://schemas.microsoft.com/office/drawing/2014/main" id="{5B24F880-A143-4F42-A08D-2E5D5D6F9E27}"/>
+              </a:ext>
+            </a:extLst>
+          </p:cNvPr>
+          <p:cNvSpPr txBox="1"/>
+          <p:nvPr/>
+        </p:nvSpPr>
+        <p:spPr>
+          <a:xfrm>
+            <a:off x="744132" y="1570246"/>
+            <a:ext cx="9244900" cy="646331"/>
+          </a:xfrm>
+          <a:prstGeom prst="rect">
+            <a:avLst/>
+          </a:prstGeom>
+          <a:noFill/>
+        </p:spPr>
+        <p:txBody>
+          <a:bodyPr wrap="square" rtlCol="0">
+            <a:spAutoFit/>
+          </a:bodyPr>
+          <a:lstStyle/>
+          <a:p>
+            <a:pPr marL="285750" indent="-285750">
+              <a:buFont typeface="Arial" panose="020B0604020202020204" pitchFamily="34" charset="0"/>
+              <a:buChar char="•"/>
+            </a:pPr>
+            <a:r>
+              <a:rPr lang="ru-RU" dirty="0"/>
+              <a:t>Количество изображений для каждой поверхности – 3</a:t>
+            </a:r>
+          </a:p>
+          <a:p>
+            <a:pPr marL="285750" indent="-285750">
+              <a:buFont typeface="Arial" panose="020B0604020202020204" pitchFamily="34" charset="0"/>
+              <a:buChar char="•"/>
+            </a:pPr>
+            <a:r>
+              <a:rPr lang="ru-RU" dirty="0"/>
+              <a:t>Количество человек, участвовавших в опросе - </a:t>
+            </a:r>
+            <a:r>
+              <a:rPr lang="en-US" dirty="0"/>
+              <a:t>n</a:t>
+            </a:r>
+            <a:endParaRPr lang="ru-RU" dirty="0"/>
+          </a:p>
+        </p:txBody>
+      </p:sp>
     </p:spTree>
     <p:extLst>
       <p:ext uri="{BB962C8B-B14F-4D97-AF65-F5344CB8AC3E}">
@@ -6888,14 +6835,14 @@
           <p:nvPr>
             <p:extLst>
               <p:ext uri="{D42A27DB-BD31-4B8C-83A1-F6EECF244321}">
-                <p14:modId xmlns:p14="http://schemas.microsoft.com/office/powerpoint/2010/main" val="432426584"/>
+                <p14:modId xmlns:p14="http://schemas.microsoft.com/office/powerpoint/2010/main" val="748857337"/>
               </p:ext>
             </p:extLst>
           </p:nvPr>
         </p:nvGraphicFramePr>
         <p:xfrm>
-          <a:off x="838200" y="1787754"/>
-          <a:ext cx="10515600" cy="3931920"/>
+          <a:off x="517108" y="1787754"/>
+          <a:ext cx="11319641" cy="3931920"/>
         </p:xfrm>
         <a:graphic>
           <a:graphicData uri="http://schemas.openxmlformats.org/drawingml/2006/table">
@@ -6904,42 +6851,42 @@
                 <a:tableStyleId>{5940675A-B579-460E-94D1-54222C63F5DA}</a:tableStyleId>
               </a:tblPr>
               <a:tblGrid>
-                <a:gridCol w="2768950">
+                <a:gridCol w="2980669">
                   <a:extLst>
                     <a:ext uri="{9D8B030D-6E8A-4147-A177-3AD203B41FA5}">
                       <a16:colId xmlns:a16="http://schemas.microsoft.com/office/drawing/2014/main" val="2933131938"/>
                     </a:ext>
                   </a:extLst>
                 </a:gridCol>
-                <a:gridCol w="1816188">
+                <a:gridCol w="1888802">
                   <a:extLst>
                     <a:ext uri="{9D8B030D-6E8A-4147-A177-3AD203B41FA5}">
                       <a16:colId xmlns:a16="http://schemas.microsoft.com/office/drawing/2014/main" val="2652727869"/>
                     </a:ext>
                   </a:extLst>
                 </a:gridCol>
-                <a:gridCol w="1652226">
+                <a:gridCol w="1392593">
                   <a:extLst>
                     <a:ext uri="{9D8B030D-6E8A-4147-A177-3AD203B41FA5}">
                       <a16:colId xmlns:a16="http://schemas.microsoft.com/office/drawing/2014/main" val="179140510"/>
                     </a:ext>
                   </a:extLst>
                 </a:gridCol>
-                <a:gridCol w="1336916">
+                <a:gridCol w="1431509">
                   <a:extLst>
                     <a:ext uri="{9D8B030D-6E8A-4147-A177-3AD203B41FA5}">
                       <a16:colId xmlns:a16="http://schemas.microsoft.com/office/drawing/2014/main" val="1361652140"/>
                     </a:ext>
                   </a:extLst>
                 </a:gridCol>
-                <a:gridCol w="1614389">
+                <a:gridCol w="1608083">
                   <a:extLst>
                     <a:ext uri="{9D8B030D-6E8A-4147-A177-3AD203B41FA5}">
                       <a16:colId xmlns:a16="http://schemas.microsoft.com/office/drawing/2014/main" val="3368442483"/>
                     </a:ext>
                   </a:extLst>
                 </a:gridCol>
-                <a:gridCol w="1326931">
+                <a:gridCol w="2017985">
                   <a:extLst>
                     <a:ext uri="{9D8B030D-6E8A-4147-A177-3AD203B41FA5}">
                       <a16:colId xmlns:a16="http://schemas.microsoft.com/office/drawing/2014/main" val="2227426513"/>
@@ -7016,8 +6963,8 @@
                     <a:lstStyle/>
                     <a:p>
                       <a:r>
-                        <a:rPr lang="ru-RU" dirty="0"/>
-                        <a:t>Отсутствие пересчета положения ИС</a:t>
+                        <a:rPr lang="ru-RU" sz="1800" dirty="0"/>
+                        <a:t>Возможность не пересчитывать положение ИС без необходимости</a:t>
                       </a:r>
                     </a:p>
                   </a:txBody>
@@ -7396,36 +7343,6 @@
           </a:p>
         </p:txBody>
       </p:sp>
-      <p:pic>
-        <p:nvPicPr>
-          <p:cNvPr id="6" name="Рисунок 5">
-            <a:extLst>
-              <a:ext uri="{FF2B5EF4-FFF2-40B4-BE49-F238E27FC236}">
-                <a16:creationId xmlns:a16="http://schemas.microsoft.com/office/drawing/2014/main" id="{A0790A80-489D-4D4E-8E78-B19577C9F3A2}"/>
-              </a:ext>
-            </a:extLst>
-          </p:cNvPr>
-          <p:cNvPicPr>
-            <a:picLocks noChangeAspect="1"/>
-          </p:cNvPicPr>
-          <p:nvPr/>
-        </p:nvPicPr>
-        <p:blipFill>
-          <a:blip r:embed="rId2"/>
-          <a:stretch>
-            <a:fillRect/>
-          </a:stretch>
-        </p:blipFill>
-        <p:spPr>
-          <a:xfrm>
-            <a:off x="5514975" y="1690688"/>
-            <a:ext cx="6191250" cy="3228975"/>
-          </a:xfrm>
-          <a:prstGeom prst="rect">
-            <a:avLst/>
-          </a:prstGeom>
-        </p:spPr>
-      </p:pic>
       <p:sp>
         <p:nvSpPr>
           <p:cNvPr id="7" name="TextBox 6">
@@ -7505,6 +7422,42 @@
           </a:p>
         </p:txBody>
       </p:sp>
+      <p:pic>
+        <p:nvPicPr>
+          <p:cNvPr id="4" name="Рисунок 3">
+            <a:extLst>
+              <a:ext uri="{FF2B5EF4-FFF2-40B4-BE49-F238E27FC236}">
+                <a16:creationId xmlns:a16="http://schemas.microsoft.com/office/drawing/2014/main" id="{6B2C99DD-21FF-49A8-A0B4-5324D4A38E20}"/>
+              </a:ext>
+            </a:extLst>
+          </p:cNvPr>
+          <p:cNvPicPr>
+            <a:picLocks noChangeAspect="1"/>
+          </p:cNvPicPr>
+          <p:nvPr/>
+        </p:nvPicPr>
+        <p:blipFill>
+          <a:blip r:embed="rId2">
+            <a:extLst>
+              <a:ext uri="{28A0092B-C50C-407E-A947-70E740481C1C}">
+                <a14:useLocalDpi xmlns:a14="http://schemas.microsoft.com/office/drawing/2010/main" val="0"/>
+              </a:ext>
+            </a:extLst>
+          </a:blip>
+          <a:stretch>
+            <a:fillRect/>
+          </a:stretch>
+        </p:blipFill>
+        <p:spPr>
+          <a:xfrm>
+            <a:off x="5426885" y="1690688"/>
+            <a:ext cx="6458049" cy="4299978"/>
+          </a:xfrm>
+          <a:prstGeom prst="rect">
+            <a:avLst/>
+          </a:prstGeom>
+        </p:spPr>
+      </p:pic>
     </p:spTree>
     <p:extLst>
       <p:ext uri="{BB962C8B-B14F-4D97-AF65-F5344CB8AC3E}">
@@ -7593,10 +7546,10 @@
       </p:sp>
       <p:pic>
         <p:nvPicPr>
-          <p:cNvPr id="5" name="Рисунок 4">
+          <p:cNvPr id="8" name="Рисунок 7">
             <a:extLst>
               <a:ext uri="{FF2B5EF4-FFF2-40B4-BE49-F238E27FC236}">
-                <a16:creationId xmlns:a16="http://schemas.microsoft.com/office/drawing/2014/main" id="{38991B3D-33CD-4418-B52C-9DB6F40E3E5D}"/>
+                <a16:creationId xmlns:a16="http://schemas.microsoft.com/office/drawing/2014/main" id="{AC022A98-0D34-4623-ADF3-30BCC297EEAC}"/>
               </a:ext>
             </a:extLst>
           </p:cNvPr>
@@ -7606,15 +7559,21 @@
           <p:nvPr/>
         </p:nvPicPr>
         <p:blipFill>
-          <a:blip r:embed="rId2"/>
+          <a:blip r:embed="rId2">
+            <a:extLst>
+              <a:ext uri="{28A0092B-C50C-407E-A947-70E740481C1C}">
+                <a14:useLocalDpi xmlns:a14="http://schemas.microsoft.com/office/drawing/2010/main" val="0"/>
+              </a:ext>
+            </a:extLst>
+          </a:blip>
           <a:stretch>
             <a:fillRect/>
           </a:stretch>
         </p:blipFill>
         <p:spPr>
           <a:xfrm>
-            <a:off x="2486025" y="1950129"/>
-            <a:ext cx="7219950" cy="3676650"/>
+            <a:off x="2873282" y="1690688"/>
+            <a:ext cx="6445436" cy="4291579"/>
           </a:xfrm>
           <a:prstGeom prst="rect">
             <a:avLst/>

</xml_diff>